<commit_message>
module-9 assignment - reference date correction
</commit_message>
<xml_diff>
--- a/module-09/Kellam_380Mod09_2.pptx
+++ b/module-09/Kellam_380Mod09_2.pptx
@@ -136,7 +136,7 @@
   <pc:docChgLst>
     <pc:chgData name="Kellam, Jeremiah {PEP}" userId="da9be42e-c097-46ac-b51e-00185e805c05" providerId="ADAL" clId="{D37B2D44-AC61-43F7-8EE0-63B02A55C96A}"/>
     <pc:docChg chg="custSel addSld delSld modSld">
-      <pc:chgData name="Kellam, Jeremiah {PEP}" userId="da9be42e-c097-46ac-b51e-00185e805c05" providerId="ADAL" clId="{D37B2D44-AC61-43F7-8EE0-63B02A55C96A}" dt="2024-07-23T01:50:35.404" v="4463" actId="403"/>
+      <pc:chgData name="Kellam, Jeremiah {PEP}" userId="da9be42e-c097-46ac-b51e-00185e805c05" providerId="ADAL" clId="{D37B2D44-AC61-43F7-8EE0-63B02A55C96A}" dt="2024-07-23T01:55:51.645" v="4469" actId="20577"/>
       <pc:docMkLst>
         <pc:docMk/>
       </pc:docMkLst>
@@ -164,13 +164,13 @@
         </pc:spChg>
       </pc:sldChg>
       <pc:sldChg chg="addSp delSp modSp mod">
-        <pc:chgData name="Kellam, Jeremiah {PEP}" userId="da9be42e-c097-46ac-b51e-00185e805c05" providerId="ADAL" clId="{D37B2D44-AC61-43F7-8EE0-63B02A55C96A}" dt="2024-07-23T01:12:41.417" v="139" actId="27636"/>
+        <pc:chgData name="Kellam, Jeremiah {PEP}" userId="da9be42e-c097-46ac-b51e-00185e805c05" providerId="ADAL" clId="{D37B2D44-AC61-43F7-8EE0-63B02A55C96A}" dt="2024-07-23T01:55:51.645" v="4469" actId="20577"/>
         <pc:sldMkLst>
           <pc:docMk/>
           <pc:sldMk cId="227515456" sldId="257"/>
         </pc:sldMkLst>
         <pc:spChg chg="mod">
-          <ac:chgData name="Kellam, Jeremiah {PEP}" userId="da9be42e-c097-46ac-b51e-00185e805c05" providerId="ADAL" clId="{D37B2D44-AC61-43F7-8EE0-63B02A55C96A}" dt="2024-07-23T01:12:41.417" v="139" actId="27636"/>
+          <ac:chgData name="Kellam, Jeremiah {PEP}" userId="da9be42e-c097-46ac-b51e-00185e805c05" providerId="ADAL" clId="{D37B2D44-AC61-43F7-8EE0-63B02A55C96A}" dt="2024-07-23T01:55:51.645" v="4469" actId="20577"/>
           <ac:spMkLst>
             <pc:docMk/>
             <pc:sldMk cId="227515456" sldId="257"/>
@@ -203,13 +203,13 @@
         </pc:spChg>
       </pc:sldChg>
       <pc:sldChg chg="modSp new mod">
-        <pc:chgData name="Kellam, Jeremiah {PEP}" userId="da9be42e-c097-46ac-b51e-00185e805c05" providerId="ADAL" clId="{D37B2D44-AC61-43F7-8EE0-63B02A55C96A}" dt="2024-07-23T01:21:18.034" v="713" actId="20577"/>
+        <pc:chgData name="Kellam, Jeremiah {PEP}" userId="da9be42e-c097-46ac-b51e-00185e805c05" providerId="ADAL" clId="{D37B2D44-AC61-43F7-8EE0-63B02A55C96A}" dt="2024-07-23T01:55:37.679" v="4465" actId="20577"/>
         <pc:sldMkLst>
           <pc:docMk/>
           <pc:sldMk cId="1873014425" sldId="258"/>
         </pc:sldMkLst>
         <pc:spChg chg="mod">
-          <ac:chgData name="Kellam, Jeremiah {PEP}" userId="da9be42e-c097-46ac-b51e-00185e805c05" providerId="ADAL" clId="{D37B2D44-AC61-43F7-8EE0-63B02A55C96A}" dt="2024-07-23T01:18:13.809" v="197" actId="20577"/>
+          <ac:chgData name="Kellam, Jeremiah {PEP}" userId="da9be42e-c097-46ac-b51e-00185e805c05" providerId="ADAL" clId="{D37B2D44-AC61-43F7-8EE0-63B02A55C96A}" dt="2024-07-23T01:55:37.679" v="4465" actId="20577"/>
           <ac:spMkLst>
             <pc:docMk/>
             <pc:sldMk cId="1873014425" sldId="258"/>
@@ -278,13 +278,13 @@
         </pc:sldMkLst>
       </pc:sldChg>
       <pc:sldChg chg="modSp new mod">
-        <pc:chgData name="Kellam, Jeremiah {PEP}" userId="da9be42e-c097-46ac-b51e-00185e805c05" providerId="ADAL" clId="{D37B2D44-AC61-43F7-8EE0-63B02A55C96A}" dt="2024-07-23T01:29:57.787" v="1610" actId="20577"/>
+        <pc:chgData name="Kellam, Jeremiah {PEP}" userId="da9be42e-c097-46ac-b51e-00185e805c05" providerId="ADAL" clId="{D37B2D44-AC61-43F7-8EE0-63B02A55C96A}" dt="2024-07-23T01:55:41.921" v="4467" actId="20577"/>
         <pc:sldMkLst>
           <pc:docMk/>
           <pc:sldMk cId="4223298864" sldId="260"/>
         </pc:sldMkLst>
         <pc:spChg chg="mod">
-          <ac:chgData name="Kellam, Jeremiah {PEP}" userId="da9be42e-c097-46ac-b51e-00185e805c05" providerId="ADAL" clId="{D37B2D44-AC61-43F7-8EE0-63B02A55C96A}" dt="2024-07-23T01:28:31.316" v="1339" actId="20577"/>
+          <ac:chgData name="Kellam, Jeremiah {PEP}" userId="da9be42e-c097-46ac-b51e-00185e805c05" providerId="ADAL" clId="{D37B2D44-AC61-43F7-8EE0-63B02A55C96A}" dt="2024-07-23T01:55:41.921" v="4467" actId="20577"/>
           <ac:spMkLst>
             <pc:docMk/>
             <pc:sldMk cId="4223298864" sldId="260"/>
@@ -1007,7 +1007,7 @@
           <a:noFill/>
           <a:extLst>
             <a:ext uri="{909E8E84-426E-40dd-AFC4-6F175D3DCCD1}">
-              <a14:hiddenFill xmlns="" xmlns:a14="http://schemas.microsoft.com/office/drawing/2010/main">
+              <a14:hiddenFill xmlns:a14="http://schemas.microsoft.com/office/drawing/2010/main" xmlns="">
                 <a:solidFill>
                   <a:srgbClr val="FFFFFF"/>
                 </a:solidFill>
@@ -1066,7 +1066,7 @@
             </a:ln>
             <a:extLst>
               <a:ext uri="{91240B29-F687-4f45-9708-019B960494DF}">
-                <a14:hiddenLine xmlns="" xmlns:a14="http://schemas.microsoft.com/office/drawing/2010/main" w="9525">
+                <a14:hiddenLine xmlns:a14="http://schemas.microsoft.com/office/drawing/2010/main" xmlns="" w="9525">
                   <a:solidFill>
                     <a:srgbClr val="000000"/>
                   </a:solidFill>
@@ -1156,7 +1156,7 @@
             </a:ln>
             <a:extLst>
               <a:ext uri="{91240B29-F687-4f45-9708-019B960494DF}">
-                <a14:hiddenLine xmlns="" xmlns:a14="http://schemas.microsoft.com/office/drawing/2010/main" w="9525">
+                <a14:hiddenLine xmlns:a14="http://schemas.microsoft.com/office/drawing/2010/main" xmlns="" w="9525">
                   <a:solidFill>
                     <a:srgbClr val="000000"/>
                   </a:solidFill>
@@ -1246,7 +1246,7 @@
             </a:ln>
             <a:extLst>
               <a:ext uri="{91240B29-F687-4f45-9708-019B960494DF}">
-                <a14:hiddenLine xmlns="" xmlns:a14="http://schemas.microsoft.com/office/drawing/2010/main" w="9525">
+                <a14:hiddenLine xmlns:a14="http://schemas.microsoft.com/office/drawing/2010/main" xmlns="" w="9525">
                   <a:solidFill>
                     <a:srgbClr val="000000"/>
                   </a:solidFill>
@@ -1280,7 +1280,7 @@
             </a:ln>
             <a:extLst>
               <a:ext uri="{91240B29-F687-4f45-9708-019B960494DF}">
-                <a14:hiddenLine xmlns="" xmlns:a14="http://schemas.microsoft.com/office/drawing/2010/main" w="9525">
+                <a14:hiddenLine xmlns:a14="http://schemas.microsoft.com/office/drawing/2010/main" xmlns="" w="9525">
                   <a:solidFill>
                     <a:srgbClr val="000000"/>
                   </a:solidFill>
@@ -1370,7 +1370,7 @@
             </a:ln>
             <a:extLst>
               <a:ext uri="{91240B29-F687-4f45-9708-019B960494DF}">
-                <a14:hiddenLine xmlns="" xmlns:a14="http://schemas.microsoft.com/office/drawing/2010/main" w="9525">
+                <a14:hiddenLine xmlns:a14="http://schemas.microsoft.com/office/drawing/2010/main" xmlns="" w="9525">
                   <a:solidFill>
                     <a:srgbClr val="000000"/>
                   </a:solidFill>
@@ -1432,7 +1432,7 @@
             </a:ln>
             <a:extLst>
               <a:ext uri="{91240B29-F687-4f45-9708-019B960494DF}">
-                <a14:hiddenLine xmlns="" xmlns:a14="http://schemas.microsoft.com/office/drawing/2010/main" w="9525">
+                <a14:hiddenLine xmlns:a14="http://schemas.microsoft.com/office/drawing/2010/main" xmlns="" w="9525">
                   <a:solidFill>
                     <a:srgbClr val="000000"/>
                   </a:solidFill>
@@ -1494,7 +1494,7 @@
             </a:ln>
             <a:extLst>
               <a:ext uri="{91240B29-F687-4f45-9708-019B960494DF}">
-                <a14:hiddenLine xmlns="" xmlns:a14="http://schemas.microsoft.com/office/drawing/2010/main" w="9525">
+                <a14:hiddenLine xmlns:a14="http://schemas.microsoft.com/office/drawing/2010/main" xmlns="" w="9525">
                   <a:solidFill>
                     <a:srgbClr val="000000"/>
                   </a:solidFill>
@@ -1584,7 +1584,7 @@
             </a:ln>
             <a:extLst>
               <a:ext uri="{91240B29-F687-4f45-9708-019B960494DF}">
-                <a14:hiddenLine xmlns="" xmlns:a14="http://schemas.microsoft.com/office/drawing/2010/main" w="9525">
+                <a14:hiddenLine xmlns:a14="http://schemas.microsoft.com/office/drawing/2010/main" xmlns="" w="9525">
                   <a:solidFill>
                     <a:srgbClr val="000000"/>
                   </a:solidFill>
@@ -1646,7 +1646,7 @@
             </a:ln>
             <a:extLst>
               <a:ext uri="{91240B29-F687-4f45-9708-019B960494DF}">
-                <a14:hiddenLine xmlns="" xmlns:a14="http://schemas.microsoft.com/office/drawing/2010/main" w="9525">
+                <a14:hiddenLine xmlns:a14="http://schemas.microsoft.com/office/drawing/2010/main" xmlns="" w="9525">
                   <a:solidFill>
                     <a:srgbClr val="000000"/>
                   </a:solidFill>
@@ -1708,7 +1708,7 @@
             </a:ln>
             <a:extLst>
               <a:ext uri="{91240B29-F687-4f45-9708-019B960494DF}">
-                <a14:hiddenLine xmlns="" xmlns:a14="http://schemas.microsoft.com/office/drawing/2010/main" w="9525">
+                <a14:hiddenLine xmlns:a14="http://schemas.microsoft.com/office/drawing/2010/main" xmlns="" w="9525">
                   <a:solidFill>
                     <a:srgbClr val="000000"/>
                   </a:solidFill>
@@ -1798,7 +1798,7 @@
             </a:ln>
             <a:extLst>
               <a:ext uri="{91240B29-F687-4f45-9708-019B960494DF}">
-                <a14:hiddenLine xmlns="" xmlns:a14="http://schemas.microsoft.com/office/drawing/2010/main" w="9525">
+                <a14:hiddenLine xmlns:a14="http://schemas.microsoft.com/office/drawing/2010/main" xmlns="" w="9525">
                   <a:solidFill>
                     <a:srgbClr val="000000"/>
                   </a:solidFill>
@@ -1888,7 +1888,7 @@
             </a:ln>
             <a:extLst>
               <a:ext uri="{91240B29-F687-4f45-9708-019B960494DF}">
-                <a14:hiddenLine xmlns="" xmlns:a14="http://schemas.microsoft.com/office/drawing/2010/main" w="9525">
+                <a14:hiddenLine xmlns:a14="http://schemas.microsoft.com/office/drawing/2010/main" xmlns="" w="9525">
                   <a:solidFill>
                     <a:srgbClr val="000000"/>
                   </a:solidFill>
@@ -1950,7 +1950,7 @@
             </a:ln>
             <a:extLst>
               <a:ext uri="{91240B29-F687-4f45-9708-019B960494DF}">
-                <a14:hiddenLine xmlns="" xmlns:a14="http://schemas.microsoft.com/office/drawing/2010/main" w="9525">
+                <a14:hiddenLine xmlns:a14="http://schemas.microsoft.com/office/drawing/2010/main" xmlns="" w="9525">
                   <a:solidFill>
                     <a:srgbClr val="000000"/>
                   </a:solidFill>
@@ -2060,7 +2060,7 @@
             </a:ln>
             <a:extLst>
               <a:ext uri="{91240B29-F687-4f45-9708-019B960494DF}">
-                <a14:hiddenLine xmlns="" xmlns:a14="http://schemas.microsoft.com/office/drawing/2010/main" w="9525">
+                <a14:hiddenLine xmlns:a14="http://schemas.microsoft.com/office/drawing/2010/main" xmlns="" w="9525">
                   <a:solidFill>
                     <a:srgbClr val="000000"/>
                   </a:solidFill>
@@ -2122,7 +2122,7 @@
             </a:ln>
             <a:extLst>
               <a:ext uri="{91240B29-F687-4f45-9708-019B960494DF}">
-                <a14:hiddenLine xmlns="" xmlns:a14="http://schemas.microsoft.com/office/drawing/2010/main" w="9525">
+                <a14:hiddenLine xmlns:a14="http://schemas.microsoft.com/office/drawing/2010/main" xmlns="" w="9525">
                   <a:solidFill>
                     <a:srgbClr val="000000"/>
                   </a:solidFill>
@@ -2212,7 +2212,7 @@
             </a:ln>
             <a:extLst>
               <a:ext uri="{91240B29-F687-4f45-9708-019B960494DF}">
-                <a14:hiddenLine xmlns="" xmlns:a14="http://schemas.microsoft.com/office/drawing/2010/main" w="9525">
+                <a14:hiddenLine xmlns:a14="http://schemas.microsoft.com/office/drawing/2010/main" xmlns="" w="9525">
                   <a:solidFill>
                     <a:srgbClr val="000000"/>
                   </a:solidFill>
@@ -2302,7 +2302,7 @@
             </a:ln>
             <a:extLst>
               <a:ext uri="{91240B29-F687-4f45-9708-019B960494DF}">
-                <a14:hiddenLine xmlns="" xmlns:a14="http://schemas.microsoft.com/office/drawing/2010/main" w="9525">
+                <a14:hiddenLine xmlns:a14="http://schemas.microsoft.com/office/drawing/2010/main" xmlns="" w="9525">
                   <a:solidFill>
                     <a:srgbClr val="000000"/>
                   </a:solidFill>
@@ -2364,7 +2364,7 @@
             </a:ln>
             <a:extLst>
               <a:ext uri="{91240B29-F687-4f45-9708-019B960494DF}">
-                <a14:hiddenLine xmlns="" xmlns:a14="http://schemas.microsoft.com/office/drawing/2010/main" w="9525">
+                <a14:hiddenLine xmlns:a14="http://schemas.microsoft.com/office/drawing/2010/main" xmlns="" w="9525">
                   <a:solidFill>
                     <a:srgbClr val="000000"/>
                   </a:solidFill>
@@ -2454,7 +2454,7 @@
             </a:ln>
             <a:extLst>
               <a:ext uri="{91240B29-F687-4f45-9708-019B960494DF}">
-                <a14:hiddenLine xmlns="" xmlns:a14="http://schemas.microsoft.com/office/drawing/2010/main" w="9525">
+                <a14:hiddenLine xmlns:a14="http://schemas.microsoft.com/office/drawing/2010/main" xmlns="" w="9525">
                   <a:solidFill>
                     <a:srgbClr val="000000"/>
                   </a:solidFill>
@@ -2544,7 +2544,7 @@
             </a:ln>
             <a:extLst>
               <a:ext uri="{91240B29-F687-4f45-9708-019B960494DF}">
-                <a14:hiddenLine xmlns="" xmlns:a14="http://schemas.microsoft.com/office/drawing/2010/main" w="9525">
+                <a14:hiddenLine xmlns:a14="http://schemas.microsoft.com/office/drawing/2010/main" xmlns="" w="9525">
                   <a:solidFill>
                     <a:srgbClr val="000000"/>
                   </a:solidFill>
@@ -2600,7 +2600,7 @@
             </a:ln>
             <a:extLst>
               <a:ext uri="{91240B29-F687-4f45-9708-019B960494DF}">
-                <a14:hiddenLine xmlns="" xmlns:a14="http://schemas.microsoft.com/office/drawing/2010/main" w="9525">
+                <a14:hiddenLine xmlns:a14="http://schemas.microsoft.com/office/drawing/2010/main" xmlns="" w="9525">
                   <a:solidFill>
                     <a:srgbClr val="000000"/>
                   </a:solidFill>
@@ -2690,7 +2690,7 @@
             </a:ln>
             <a:extLst>
               <a:ext uri="{91240B29-F687-4f45-9708-019B960494DF}">
-                <a14:hiddenLine xmlns="" xmlns:a14="http://schemas.microsoft.com/office/drawing/2010/main" w="9525">
+                <a14:hiddenLine xmlns:a14="http://schemas.microsoft.com/office/drawing/2010/main" xmlns="" w="9525">
                   <a:solidFill>
                     <a:srgbClr val="000000"/>
                   </a:solidFill>
@@ -2746,7 +2746,7 @@
             </a:ln>
             <a:extLst>
               <a:ext uri="{91240B29-F687-4f45-9708-019B960494DF}">
-                <a14:hiddenLine xmlns="" xmlns:a14="http://schemas.microsoft.com/office/drawing/2010/main" w="9525">
+                <a14:hiddenLine xmlns:a14="http://schemas.microsoft.com/office/drawing/2010/main" xmlns="" w="9525">
                   <a:solidFill>
                     <a:srgbClr val="000000"/>
                   </a:solidFill>
@@ -2836,7 +2836,7 @@
             </a:ln>
             <a:extLst>
               <a:ext uri="{91240B29-F687-4f45-9708-019B960494DF}">
-                <a14:hiddenLine xmlns="" xmlns:a14="http://schemas.microsoft.com/office/drawing/2010/main" w="9525">
+                <a14:hiddenLine xmlns:a14="http://schemas.microsoft.com/office/drawing/2010/main" xmlns="" w="9525">
                   <a:solidFill>
                     <a:srgbClr val="000000"/>
                   </a:solidFill>
@@ -2904,7 +2904,7 @@
             </a:ln>
             <a:extLst>
               <a:ext uri="{91240B29-F687-4f45-9708-019B960494DF}">
-                <a14:hiddenLine xmlns="" xmlns:a14="http://schemas.microsoft.com/office/drawing/2010/main" w="9525">
+                <a14:hiddenLine xmlns:a14="http://schemas.microsoft.com/office/drawing/2010/main" xmlns="" w="9525">
                   <a:solidFill>
                     <a:srgbClr val="000000"/>
                   </a:solidFill>
@@ -2994,7 +2994,7 @@
             </a:ln>
             <a:extLst>
               <a:ext uri="{91240B29-F687-4f45-9708-019B960494DF}">
-                <a14:hiddenLine xmlns="" xmlns:a14="http://schemas.microsoft.com/office/drawing/2010/main" w="9525">
+                <a14:hiddenLine xmlns:a14="http://schemas.microsoft.com/office/drawing/2010/main" xmlns="" w="9525">
                   <a:solidFill>
                     <a:srgbClr val="000000"/>
                   </a:solidFill>
@@ -3062,7 +3062,7 @@
             </a:ln>
             <a:extLst>
               <a:ext uri="{91240B29-F687-4f45-9708-019B960494DF}">
-                <a14:hiddenLine xmlns="" xmlns:a14="http://schemas.microsoft.com/office/drawing/2010/main" w="9525">
+                <a14:hiddenLine xmlns:a14="http://schemas.microsoft.com/office/drawing/2010/main" xmlns="" w="9525">
                   <a:solidFill>
                     <a:srgbClr val="000000"/>
                   </a:solidFill>
@@ -3152,7 +3152,7 @@
             </a:ln>
             <a:extLst>
               <a:ext uri="{91240B29-F687-4f45-9708-019B960494DF}">
-                <a14:hiddenLine xmlns="" xmlns:a14="http://schemas.microsoft.com/office/drawing/2010/main" w="9525">
+                <a14:hiddenLine xmlns:a14="http://schemas.microsoft.com/office/drawing/2010/main" xmlns="" w="9525">
                   <a:solidFill>
                     <a:srgbClr val="000000"/>
                   </a:solidFill>
@@ -3186,7 +3186,7 @@
             </a:ln>
             <a:extLst>
               <a:ext uri="{91240B29-F687-4f45-9708-019B960494DF}">
-                <a14:hiddenLine xmlns="" xmlns:a14="http://schemas.microsoft.com/office/drawing/2010/main" w="9525">
+                <a14:hiddenLine xmlns:a14="http://schemas.microsoft.com/office/drawing/2010/main" xmlns="" w="9525">
                   <a:solidFill>
                     <a:srgbClr val="000000"/>
                   </a:solidFill>
@@ -3276,7 +3276,7 @@
             </a:ln>
             <a:extLst>
               <a:ext uri="{91240B29-F687-4f45-9708-019B960494DF}">
-                <a14:hiddenLine xmlns="" xmlns:a14="http://schemas.microsoft.com/office/drawing/2010/main" w="9525">
+                <a14:hiddenLine xmlns:a14="http://schemas.microsoft.com/office/drawing/2010/main" xmlns="" w="9525">
                   <a:solidFill>
                     <a:srgbClr val="000000"/>
                   </a:solidFill>
@@ -3338,7 +3338,7 @@
             </a:ln>
             <a:extLst>
               <a:ext uri="{91240B29-F687-4f45-9708-019B960494DF}">
-                <a14:hiddenLine xmlns="" xmlns:a14="http://schemas.microsoft.com/office/drawing/2010/main" w="9525">
+                <a14:hiddenLine xmlns:a14="http://schemas.microsoft.com/office/drawing/2010/main" xmlns="" w="9525">
                   <a:solidFill>
                     <a:srgbClr val="000000"/>
                   </a:solidFill>
@@ -3400,7 +3400,7 @@
             </a:ln>
             <a:extLst>
               <a:ext uri="{91240B29-F687-4f45-9708-019B960494DF}">
-                <a14:hiddenLine xmlns="" xmlns:a14="http://schemas.microsoft.com/office/drawing/2010/main" w="9525">
+                <a14:hiddenLine xmlns:a14="http://schemas.microsoft.com/office/drawing/2010/main" xmlns="" w="9525">
                   <a:solidFill>
                     <a:srgbClr val="000000"/>
                   </a:solidFill>
@@ -3490,7 +3490,7 @@
             </a:ln>
             <a:extLst>
               <a:ext uri="{91240B29-F687-4f45-9708-019B960494DF}">
-                <a14:hiddenLine xmlns="" xmlns:a14="http://schemas.microsoft.com/office/drawing/2010/main" w="9525">
+                <a14:hiddenLine xmlns:a14="http://schemas.microsoft.com/office/drawing/2010/main" xmlns="" w="9525">
                   <a:solidFill>
                     <a:srgbClr val="000000"/>
                   </a:solidFill>
@@ -3558,7 +3558,7 @@
             </a:ln>
             <a:extLst>
               <a:ext uri="{91240B29-F687-4f45-9708-019B960494DF}">
-                <a14:hiddenLine xmlns="" xmlns:a14="http://schemas.microsoft.com/office/drawing/2010/main" w="9525">
+                <a14:hiddenLine xmlns:a14="http://schemas.microsoft.com/office/drawing/2010/main" xmlns="" w="9525">
                   <a:solidFill>
                     <a:srgbClr val="000000"/>
                   </a:solidFill>
@@ -3620,7 +3620,7 @@
             </a:ln>
             <a:extLst>
               <a:ext uri="{91240B29-F687-4f45-9708-019B960494DF}">
-                <a14:hiddenLine xmlns="" xmlns:a14="http://schemas.microsoft.com/office/drawing/2010/main" w="9525">
+                <a14:hiddenLine xmlns:a14="http://schemas.microsoft.com/office/drawing/2010/main" xmlns="" w="9525">
                   <a:solidFill>
                     <a:srgbClr val="000000"/>
                   </a:solidFill>
@@ -3710,7 +3710,7 @@
             </a:ln>
             <a:extLst>
               <a:ext uri="{91240B29-F687-4f45-9708-019B960494DF}">
-                <a14:hiddenLine xmlns="" xmlns:a14="http://schemas.microsoft.com/office/drawing/2010/main" w="9525">
+                <a14:hiddenLine xmlns:a14="http://schemas.microsoft.com/office/drawing/2010/main" xmlns="" w="9525">
                   <a:solidFill>
                     <a:srgbClr val="000000"/>
                   </a:solidFill>
@@ -3772,7 +3772,7 @@
             </a:ln>
             <a:extLst>
               <a:ext uri="{91240B29-F687-4f45-9708-019B960494DF}">
-                <a14:hiddenLine xmlns="" xmlns:a14="http://schemas.microsoft.com/office/drawing/2010/main" w="9525">
+                <a14:hiddenLine xmlns:a14="http://schemas.microsoft.com/office/drawing/2010/main" xmlns="" w="9525">
                   <a:solidFill>
                     <a:srgbClr val="000000"/>
                   </a:solidFill>
@@ -3862,7 +3862,7 @@
             </a:ln>
             <a:extLst>
               <a:ext uri="{91240B29-F687-4f45-9708-019B960494DF}">
-                <a14:hiddenLine xmlns="" xmlns:a14="http://schemas.microsoft.com/office/drawing/2010/main" w="9525">
+                <a14:hiddenLine xmlns:a14="http://schemas.microsoft.com/office/drawing/2010/main" xmlns="" w="9525">
                   <a:solidFill>
                     <a:srgbClr val="000000"/>
                   </a:solidFill>
@@ -3924,7 +3924,7 @@
             </a:ln>
             <a:extLst>
               <a:ext uri="{91240B29-F687-4f45-9708-019B960494DF}">
-                <a14:hiddenLine xmlns="" xmlns:a14="http://schemas.microsoft.com/office/drawing/2010/main" w="9525">
+                <a14:hiddenLine xmlns:a14="http://schemas.microsoft.com/office/drawing/2010/main" xmlns="" w="9525">
                   <a:solidFill>
                     <a:srgbClr val="000000"/>
                   </a:solidFill>
@@ -4014,7 +4014,7 @@
             </a:ln>
             <a:extLst>
               <a:ext uri="{91240B29-F687-4f45-9708-019B960494DF}">
-                <a14:hiddenLine xmlns="" xmlns:a14="http://schemas.microsoft.com/office/drawing/2010/main" w="9525">
+                <a14:hiddenLine xmlns:a14="http://schemas.microsoft.com/office/drawing/2010/main" xmlns="" w="9525">
                   <a:solidFill>
                     <a:srgbClr val="000000"/>
                   </a:solidFill>
@@ -4048,7 +4048,7 @@
             </a:ln>
             <a:extLst>
               <a:ext uri="{91240B29-F687-4f45-9708-019B960494DF}">
-                <a14:hiddenLine xmlns="" xmlns:a14="http://schemas.microsoft.com/office/drawing/2010/main" w="9525">
+                <a14:hiddenLine xmlns:a14="http://schemas.microsoft.com/office/drawing/2010/main" xmlns="" w="9525">
                   <a:solidFill>
                     <a:srgbClr val="000000"/>
                   </a:solidFill>
@@ -4113,7 +4113,7 @@
             </a:ln>
             <a:extLst>
               <a:ext uri="{91240B29-F687-4f45-9708-019B960494DF}">
-                <a14:hiddenLine xmlns="" xmlns:a14="http://schemas.microsoft.com/office/drawing/2010/main" w="9525">
+                <a14:hiddenLine xmlns:a14="http://schemas.microsoft.com/office/drawing/2010/main" xmlns="" w="9525">
                   <a:solidFill>
                     <a:srgbClr val="000000"/>
                   </a:solidFill>
@@ -4203,7 +4203,7 @@
             </a:ln>
             <a:extLst>
               <a:ext uri="{91240B29-F687-4f45-9708-019B960494DF}">
-                <a14:hiddenLine xmlns="" xmlns:a14="http://schemas.microsoft.com/office/drawing/2010/main" w="9525">
+                <a14:hiddenLine xmlns:a14="http://schemas.microsoft.com/office/drawing/2010/main" xmlns="" w="9525">
                   <a:solidFill>
                     <a:srgbClr val="000000"/>
                   </a:solidFill>
@@ -4265,7 +4265,7 @@
             </a:ln>
             <a:extLst>
               <a:ext uri="{91240B29-F687-4f45-9708-019B960494DF}">
-                <a14:hiddenLine xmlns="" xmlns:a14="http://schemas.microsoft.com/office/drawing/2010/main" w="9525">
+                <a14:hiddenLine xmlns:a14="http://schemas.microsoft.com/office/drawing/2010/main" xmlns="" w="9525">
                   <a:solidFill>
                     <a:srgbClr val="000000"/>
                   </a:solidFill>
@@ -4355,7 +4355,7 @@
             </a:ln>
             <a:extLst>
               <a:ext uri="{91240B29-F687-4f45-9708-019B960494DF}">
-                <a14:hiddenLine xmlns="" xmlns:a14="http://schemas.microsoft.com/office/drawing/2010/main" w="9525">
+                <a14:hiddenLine xmlns:a14="http://schemas.microsoft.com/office/drawing/2010/main" xmlns="" w="9525">
                   <a:solidFill>
                     <a:srgbClr val="000000"/>
                   </a:solidFill>
@@ -4445,7 +4445,7 @@
             </a:ln>
             <a:extLst>
               <a:ext uri="{91240B29-F687-4f45-9708-019B960494DF}">
-                <a14:hiddenLine xmlns="" xmlns:a14="http://schemas.microsoft.com/office/drawing/2010/main" w="9525">
+                <a14:hiddenLine xmlns:a14="http://schemas.microsoft.com/office/drawing/2010/main" xmlns="" w="9525">
                   <a:solidFill>
                     <a:srgbClr val="000000"/>
                   </a:solidFill>
@@ -4510,7 +4510,7 @@
             </a:ln>
             <a:extLst>
               <a:ext uri="{91240B29-F687-4f45-9708-019B960494DF}">
-                <a14:hiddenLine xmlns="" xmlns:a14="http://schemas.microsoft.com/office/drawing/2010/main" w="9525">
+                <a14:hiddenLine xmlns:a14="http://schemas.microsoft.com/office/drawing/2010/main" xmlns="" w="9525">
                   <a:solidFill>
                     <a:srgbClr val="000000"/>
                   </a:solidFill>
@@ -4572,7 +4572,7 @@
             </a:ln>
             <a:extLst>
               <a:ext uri="{91240B29-F687-4f45-9708-019B960494DF}">
-                <a14:hiddenLine xmlns="" xmlns:a14="http://schemas.microsoft.com/office/drawing/2010/main" w="9525">
+                <a14:hiddenLine xmlns:a14="http://schemas.microsoft.com/office/drawing/2010/main" xmlns="" w="9525">
                   <a:solidFill>
                     <a:srgbClr val="000000"/>
                   </a:solidFill>
@@ -4662,7 +4662,7 @@
             </a:ln>
             <a:extLst>
               <a:ext uri="{91240B29-F687-4f45-9708-019B960494DF}">
-                <a14:hiddenLine xmlns="" xmlns:a14="http://schemas.microsoft.com/office/drawing/2010/main" w="9525">
+                <a14:hiddenLine xmlns:a14="http://schemas.microsoft.com/office/drawing/2010/main" xmlns="" w="9525">
                   <a:solidFill>
                     <a:srgbClr val="000000"/>
                   </a:solidFill>
@@ -4752,7 +4752,7 @@
             </a:ln>
             <a:extLst>
               <a:ext uri="{91240B29-F687-4f45-9708-019B960494DF}">
-                <a14:hiddenLine xmlns="" xmlns:a14="http://schemas.microsoft.com/office/drawing/2010/main" w="9525">
+                <a14:hiddenLine xmlns:a14="http://schemas.microsoft.com/office/drawing/2010/main" xmlns="" w="9525">
                   <a:solidFill>
                     <a:srgbClr val="000000"/>
                   </a:solidFill>
@@ -4814,7 +4814,7 @@
             </a:ln>
             <a:extLst>
               <a:ext uri="{91240B29-F687-4f45-9708-019B960494DF}">
-                <a14:hiddenLine xmlns="" xmlns:a14="http://schemas.microsoft.com/office/drawing/2010/main" w="9525">
+                <a14:hiddenLine xmlns:a14="http://schemas.microsoft.com/office/drawing/2010/main" xmlns="" w="9525">
                   <a:solidFill>
                     <a:srgbClr val="000000"/>
                   </a:solidFill>
@@ -4934,7 +4934,7 @@
             </a:ln>
             <a:extLst>
               <a:ext uri="{91240B29-F687-4f45-9708-019B960494DF}">
-                <a14:hiddenLine xmlns="" xmlns:a14="http://schemas.microsoft.com/office/drawing/2010/main" w="9525">
+                <a14:hiddenLine xmlns:a14="http://schemas.microsoft.com/office/drawing/2010/main" xmlns="" w="9525">
                   <a:solidFill>
                     <a:srgbClr val="000000"/>
                   </a:solidFill>
@@ -5002,7 +5002,7 @@
             </a:ln>
             <a:extLst>
               <a:ext uri="{91240B29-F687-4f45-9708-019B960494DF}">
-                <a14:hiddenLine xmlns="" xmlns:a14="http://schemas.microsoft.com/office/drawing/2010/main" w="9525">
+                <a14:hiddenLine xmlns:a14="http://schemas.microsoft.com/office/drawing/2010/main" xmlns="" w="9525">
                   <a:solidFill>
                     <a:srgbClr val="000000"/>
                   </a:solidFill>
@@ -5092,7 +5092,7 @@
             </a:ln>
             <a:extLst>
               <a:ext uri="{91240B29-F687-4f45-9708-019B960494DF}">
-                <a14:hiddenLine xmlns="" xmlns:a14="http://schemas.microsoft.com/office/drawing/2010/main" w="9525">
+                <a14:hiddenLine xmlns:a14="http://schemas.microsoft.com/office/drawing/2010/main" xmlns="" w="9525">
                   <a:solidFill>
                     <a:srgbClr val="000000"/>
                   </a:solidFill>
@@ -9821,7 +9821,7 @@
           <a:noFill/>
           <a:extLst>
             <a:ext uri="{909E8E84-426E-40dd-AFC4-6F175D3DCCD1}">
-              <a14:hiddenFill xmlns="" xmlns:a14="http://schemas.microsoft.com/office/drawing/2010/main">
+              <a14:hiddenFill xmlns:a14="http://schemas.microsoft.com/office/drawing/2010/main" xmlns="">
                 <a:solidFill>
                   <a:srgbClr val="FFFFFF"/>
                 </a:solidFill>
@@ -9895,7 +9895,7 @@
               </a:ln>
               <a:extLst>
                 <a:ext uri="{91240B29-F687-4f45-9708-019B960494DF}">
-                  <a14:hiddenLine xmlns="" xmlns:a14="http://schemas.microsoft.com/office/drawing/2010/main" w="9525">
+                  <a14:hiddenLine xmlns:a14="http://schemas.microsoft.com/office/drawing/2010/main" xmlns="" w="9525">
                     <a:solidFill>
                       <a:srgbClr val="000000"/>
                     </a:solidFill>
@@ -9985,7 +9985,7 @@
               </a:ln>
               <a:extLst>
                 <a:ext uri="{91240B29-F687-4f45-9708-019B960494DF}">
-                  <a14:hiddenLine xmlns="" xmlns:a14="http://schemas.microsoft.com/office/drawing/2010/main" w="9525">
+                  <a14:hiddenLine xmlns:a14="http://schemas.microsoft.com/office/drawing/2010/main" xmlns="" w="9525">
                     <a:solidFill>
                       <a:srgbClr val="000000"/>
                     </a:solidFill>
@@ -10075,7 +10075,7 @@
               </a:ln>
               <a:extLst>
                 <a:ext uri="{91240B29-F687-4f45-9708-019B960494DF}">
-                  <a14:hiddenLine xmlns="" xmlns:a14="http://schemas.microsoft.com/office/drawing/2010/main" w="9525">
+                  <a14:hiddenLine xmlns:a14="http://schemas.microsoft.com/office/drawing/2010/main" xmlns="" w="9525">
                     <a:solidFill>
                       <a:srgbClr val="000000"/>
                     </a:solidFill>
@@ -10137,7 +10137,7 @@
               </a:ln>
               <a:extLst>
                 <a:ext uri="{91240B29-F687-4f45-9708-019B960494DF}">
-                  <a14:hiddenLine xmlns="" xmlns:a14="http://schemas.microsoft.com/office/drawing/2010/main" w="9525">
+                  <a14:hiddenLine xmlns:a14="http://schemas.microsoft.com/office/drawing/2010/main" xmlns="" w="9525">
                     <a:solidFill>
                       <a:srgbClr val="000000"/>
                     </a:solidFill>
@@ -10227,7 +10227,7 @@
               </a:ln>
               <a:extLst>
                 <a:ext uri="{91240B29-F687-4f45-9708-019B960494DF}">
-                  <a14:hiddenLine xmlns="" xmlns:a14="http://schemas.microsoft.com/office/drawing/2010/main" w="9525">
+                  <a14:hiddenLine xmlns:a14="http://schemas.microsoft.com/office/drawing/2010/main" xmlns="" w="9525">
                     <a:solidFill>
                       <a:srgbClr val="000000"/>
                     </a:solidFill>
@@ -10289,7 +10289,7 @@
               </a:ln>
               <a:extLst>
                 <a:ext uri="{91240B29-F687-4f45-9708-019B960494DF}">
-                  <a14:hiddenLine xmlns="" xmlns:a14="http://schemas.microsoft.com/office/drawing/2010/main" w="9525">
+                  <a14:hiddenLine xmlns:a14="http://schemas.microsoft.com/office/drawing/2010/main" xmlns="" w="9525">
                     <a:solidFill>
                       <a:srgbClr val="000000"/>
                     </a:solidFill>
@@ -10351,7 +10351,7 @@
               </a:ln>
               <a:extLst>
                 <a:ext uri="{91240B29-F687-4f45-9708-019B960494DF}">
-                  <a14:hiddenLine xmlns="" xmlns:a14="http://schemas.microsoft.com/office/drawing/2010/main" w="9525">
+                  <a14:hiddenLine xmlns:a14="http://schemas.microsoft.com/office/drawing/2010/main" xmlns="" w="9525">
                     <a:solidFill>
                       <a:srgbClr val="000000"/>
                     </a:solidFill>
@@ -10441,7 +10441,7 @@
               </a:ln>
               <a:extLst>
                 <a:ext uri="{91240B29-F687-4f45-9708-019B960494DF}">
-                  <a14:hiddenLine xmlns="" xmlns:a14="http://schemas.microsoft.com/office/drawing/2010/main" w="9525">
+                  <a14:hiddenLine xmlns:a14="http://schemas.microsoft.com/office/drawing/2010/main" xmlns="" w="9525">
                     <a:solidFill>
                       <a:srgbClr val="000000"/>
                     </a:solidFill>
@@ -10531,7 +10531,7 @@
               </a:ln>
               <a:extLst>
                 <a:ext uri="{91240B29-F687-4f45-9708-019B960494DF}">
-                  <a14:hiddenLine xmlns="" xmlns:a14="http://schemas.microsoft.com/office/drawing/2010/main" w="9525">
+                  <a14:hiddenLine xmlns:a14="http://schemas.microsoft.com/office/drawing/2010/main" xmlns="" w="9525">
                     <a:solidFill>
                       <a:srgbClr val="000000"/>
                     </a:solidFill>
@@ -10593,7 +10593,7 @@
               </a:ln>
               <a:extLst>
                 <a:ext uri="{91240B29-F687-4f45-9708-019B960494DF}">
-                  <a14:hiddenLine xmlns="" xmlns:a14="http://schemas.microsoft.com/office/drawing/2010/main" w="9525">
+                  <a14:hiddenLine xmlns:a14="http://schemas.microsoft.com/office/drawing/2010/main" xmlns="" w="9525">
                     <a:solidFill>
                       <a:srgbClr val="000000"/>
                     </a:solidFill>
@@ -10703,7 +10703,7 @@
               </a:ln>
               <a:extLst>
                 <a:ext uri="{91240B29-F687-4f45-9708-019B960494DF}">
-                  <a14:hiddenLine xmlns="" xmlns:a14="http://schemas.microsoft.com/office/drawing/2010/main" w="9525">
+                  <a14:hiddenLine xmlns:a14="http://schemas.microsoft.com/office/drawing/2010/main" xmlns="" w="9525">
                     <a:solidFill>
                       <a:srgbClr val="000000"/>
                     </a:solidFill>
@@ -10787,7 +10787,7 @@
               </a:ln>
               <a:extLst>
                 <a:ext uri="{91240B29-F687-4f45-9708-019B960494DF}">
-                  <a14:hiddenLine xmlns="" xmlns:a14="http://schemas.microsoft.com/office/drawing/2010/main" w="9525">
+                  <a14:hiddenLine xmlns:a14="http://schemas.microsoft.com/office/drawing/2010/main" xmlns="" w="9525">
                     <a:solidFill>
                       <a:srgbClr val="000000"/>
                     </a:solidFill>
@@ -10849,7 +10849,7 @@
               </a:ln>
               <a:extLst>
                 <a:ext uri="{91240B29-F687-4f45-9708-019B960494DF}">
-                  <a14:hiddenLine xmlns="" xmlns:a14="http://schemas.microsoft.com/office/drawing/2010/main" w="9525">
+                  <a14:hiddenLine xmlns:a14="http://schemas.microsoft.com/office/drawing/2010/main" xmlns="" w="9525">
                     <a:solidFill>
                       <a:srgbClr val="000000"/>
                     </a:solidFill>
@@ -10911,7 +10911,7 @@
               </a:ln>
               <a:extLst>
                 <a:ext uri="{91240B29-F687-4f45-9708-019B960494DF}">
-                  <a14:hiddenLine xmlns="" xmlns:a14="http://schemas.microsoft.com/office/drawing/2010/main" w="9525">
+                  <a14:hiddenLine xmlns:a14="http://schemas.microsoft.com/office/drawing/2010/main" xmlns="" w="9525">
                     <a:solidFill>
                       <a:srgbClr val="000000"/>
                     </a:solidFill>
@@ -11001,7 +11001,7 @@
               </a:ln>
               <a:extLst>
                 <a:ext uri="{91240B29-F687-4f45-9708-019B960494DF}">
-                  <a14:hiddenLine xmlns="" xmlns:a14="http://schemas.microsoft.com/office/drawing/2010/main" w="9525">
+                  <a14:hiddenLine xmlns:a14="http://schemas.microsoft.com/office/drawing/2010/main" xmlns="" w="9525">
                     <a:solidFill>
                       <a:srgbClr val="000000"/>
                     </a:solidFill>
@@ -11035,7 +11035,7 @@
               </a:ln>
               <a:extLst>
                 <a:ext uri="{91240B29-F687-4f45-9708-019B960494DF}">
-                  <a14:hiddenLine xmlns="" xmlns:a14="http://schemas.microsoft.com/office/drawing/2010/main" w="9525">
+                  <a14:hiddenLine xmlns:a14="http://schemas.microsoft.com/office/drawing/2010/main" xmlns="" w="9525">
                     <a:solidFill>
                       <a:srgbClr val="000000"/>
                     </a:solidFill>
@@ -11100,7 +11100,7 @@
               </a:ln>
               <a:extLst>
                 <a:ext uri="{91240B29-F687-4f45-9708-019B960494DF}">
-                  <a14:hiddenLine xmlns="" xmlns:a14="http://schemas.microsoft.com/office/drawing/2010/main" w="9525">
+                  <a14:hiddenLine xmlns:a14="http://schemas.microsoft.com/office/drawing/2010/main" xmlns="" w="9525">
                     <a:solidFill>
                       <a:srgbClr val="000000"/>
                     </a:solidFill>
@@ -11190,7 +11190,7 @@
               </a:ln>
               <a:extLst>
                 <a:ext uri="{91240B29-F687-4f45-9708-019B960494DF}">
-                  <a14:hiddenLine xmlns="" xmlns:a14="http://schemas.microsoft.com/office/drawing/2010/main" w="9525">
+                  <a14:hiddenLine xmlns:a14="http://schemas.microsoft.com/office/drawing/2010/main" xmlns="" w="9525">
                     <a:solidFill>
                       <a:srgbClr val="000000"/>
                     </a:solidFill>
@@ -11252,7 +11252,7 @@
               </a:ln>
               <a:extLst>
                 <a:ext uri="{91240B29-F687-4f45-9708-019B960494DF}">
-                  <a14:hiddenLine xmlns="" xmlns:a14="http://schemas.microsoft.com/office/drawing/2010/main" w="9525">
+                  <a14:hiddenLine xmlns:a14="http://schemas.microsoft.com/office/drawing/2010/main" xmlns="" w="9525">
                     <a:solidFill>
                       <a:srgbClr val="000000"/>
                     </a:solidFill>
@@ -11342,7 +11342,7 @@
               </a:ln>
               <a:extLst>
                 <a:ext uri="{91240B29-F687-4f45-9708-019B960494DF}">
-                  <a14:hiddenLine xmlns="" xmlns:a14="http://schemas.microsoft.com/office/drawing/2010/main" w="9525">
+                  <a14:hiddenLine xmlns:a14="http://schemas.microsoft.com/office/drawing/2010/main" xmlns="" w="9525">
                     <a:solidFill>
                       <a:srgbClr val="000000"/>
                     </a:solidFill>
@@ -11407,7 +11407,7 @@
               </a:ln>
               <a:extLst>
                 <a:ext uri="{91240B29-F687-4f45-9708-019B960494DF}">
-                  <a14:hiddenLine xmlns="" xmlns:a14="http://schemas.microsoft.com/office/drawing/2010/main" w="9525">
+                  <a14:hiddenLine xmlns:a14="http://schemas.microsoft.com/office/drawing/2010/main" xmlns="" w="9525">
                     <a:solidFill>
                       <a:srgbClr val="000000"/>
                     </a:solidFill>
@@ -11469,7 +11469,7 @@
               </a:ln>
               <a:extLst>
                 <a:ext uri="{91240B29-F687-4f45-9708-019B960494DF}">
-                  <a14:hiddenLine xmlns="" xmlns:a14="http://schemas.microsoft.com/office/drawing/2010/main" w="9525">
+                  <a14:hiddenLine xmlns:a14="http://schemas.microsoft.com/office/drawing/2010/main" xmlns="" w="9525">
                     <a:solidFill>
                       <a:srgbClr val="000000"/>
                     </a:solidFill>
@@ -11559,7 +11559,7 @@
               </a:ln>
               <a:extLst>
                 <a:ext uri="{91240B29-F687-4f45-9708-019B960494DF}">
-                  <a14:hiddenLine xmlns="" xmlns:a14="http://schemas.microsoft.com/office/drawing/2010/main" w="9525">
+                  <a14:hiddenLine xmlns:a14="http://schemas.microsoft.com/office/drawing/2010/main" xmlns="" w="9525">
                     <a:solidFill>
                       <a:srgbClr val="000000"/>
                     </a:solidFill>
@@ -11649,7 +11649,7 @@
               </a:ln>
               <a:extLst>
                 <a:ext uri="{91240B29-F687-4f45-9708-019B960494DF}">
-                  <a14:hiddenLine xmlns="" xmlns:a14="http://schemas.microsoft.com/office/drawing/2010/main" w="9525">
+                  <a14:hiddenLine xmlns:a14="http://schemas.microsoft.com/office/drawing/2010/main" xmlns="" w="9525">
                     <a:solidFill>
                       <a:srgbClr val="000000"/>
                     </a:solidFill>
@@ -11714,7 +11714,7 @@
               </a:ln>
               <a:extLst>
                 <a:ext uri="{91240B29-F687-4f45-9708-019B960494DF}">
-                  <a14:hiddenLine xmlns="" xmlns:a14="http://schemas.microsoft.com/office/drawing/2010/main" w="9525">
+                  <a14:hiddenLine xmlns:a14="http://schemas.microsoft.com/office/drawing/2010/main" xmlns="" w="9525">
                     <a:solidFill>
                       <a:srgbClr val="000000"/>
                     </a:solidFill>
@@ -11834,7 +11834,7 @@
               </a:ln>
               <a:extLst>
                 <a:ext uri="{91240B29-F687-4f45-9708-019B960494DF}">
-                  <a14:hiddenLine xmlns="" xmlns:a14="http://schemas.microsoft.com/office/drawing/2010/main" w="9525">
+                  <a14:hiddenLine xmlns:a14="http://schemas.microsoft.com/office/drawing/2010/main" xmlns="" w="9525">
                     <a:solidFill>
                       <a:srgbClr val="000000"/>
                     </a:solidFill>
@@ -11915,7 +11915,7 @@
               </a:ln>
               <a:extLst>
                 <a:ext uri="{91240B29-F687-4f45-9708-019B960494DF}">
-                  <a14:hiddenLine xmlns="" xmlns:a14="http://schemas.microsoft.com/office/drawing/2010/main" w="9525">
+                  <a14:hiddenLine xmlns:a14="http://schemas.microsoft.com/office/drawing/2010/main" xmlns="" w="9525">
                     <a:solidFill>
                       <a:srgbClr val="000000"/>
                     </a:solidFill>
@@ -12030,7 +12030,7 @@
               </a:ln>
               <a:extLst>
                 <a:ext uri="{91240B29-F687-4f45-9708-019B960494DF}">
-                  <a14:hiddenLine xmlns="" xmlns:a14="http://schemas.microsoft.com/office/drawing/2010/main" w="9525">
+                  <a14:hiddenLine xmlns:a14="http://schemas.microsoft.com/office/drawing/2010/main" xmlns="" w="9525">
                     <a:solidFill>
                       <a:srgbClr val="000000"/>
                     </a:solidFill>
@@ -12120,7 +12120,7 @@
               </a:ln>
               <a:extLst>
                 <a:ext uri="{91240B29-F687-4f45-9708-019B960494DF}">
-                  <a14:hiddenLine xmlns="" xmlns:a14="http://schemas.microsoft.com/office/drawing/2010/main" w="9525">
+                  <a14:hiddenLine xmlns:a14="http://schemas.microsoft.com/office/drawing/2010/main" xmlns="" w="9525">
                     <a:solidFill>
                       <a:srgbClr val="000000"/>
                     </a:solidFill>
@@ -12185,7 +12185,7 @@
               </a:ln>
               <a:extLst>
                 <a:ext uri="{91240B29-F687-4f45-9708-019B960494DF}">
-                  <a14:hiddenLine xmlns="" xmlns:a14="http://schemas.microsoft.com/office/drawing/2010/main" w="9525">
+                  <a14:hiddenLine xmlns:a14="http://schemas.microsoft.com/office/drawing/2010/main" xmlns="" w="9525">
                     <a:solidFill>
                       <a:srgbClr val="000000"/>
                     </a:solidFill>
@@ -12275,7 +12275,7 @@
               </a:ln>
               <a:extLst>
                 <a:ext uri="{91240B29-F687-4f45-9708-019B960494DF}">
-                  <a14:hiddenLine xmlns="" xmlns:a14="http://schemas.microsoft.com/office/drawing/2010/main" w="9525">
+                  <a14:hiddenLine xmlns:a14="http://schemas.microsoft.com/office/drawing/2010/main" xmlns="" w="9525">
                     <a:solidFill>
                       <a:srgbClr val="000000"/>
                     </a:solidFill>
@@ -12343,7 +12343,7 @@
               </a:ln>
               <a:extLst>
                 <a:ext uri="{91240B29-F687-4f45-9708-019B960494DF}">
-                  <a14:hiddenLine xmlns="" xmlns:a14="http://schemas.microsoft.com/office/drawing/2010/main" w="9525">
+                  <a14:hiddenLine xmlns:a14="http://schemas.microsoft.com/office/drawing/2010/main" xmlns="" w="9525">
                     <a:solidFill>
                       <a:srgbClr val="000000"/>
                     </a:solidFill>
@@ -12433,7 +12433,7 @@
               </a:ln>
               <a:extLst>
                 <a:ext uri="{91240B29-F687-4f45-9708-019B960494DF}">
-                  <a14:hiddenLine xmlns="" xmlns:a14="http://schemas.microsoft.com/office/drawing/2010/main" w="9525">
+                  <a14:hiddenLine xmlns:a14="http://schemas.microsoft.com/office/drawing/2010/main" xmlns="" w="9525">
                     <a:solidFill>
                       <a:srgbClr val="000000"/>
                     </a:solidFill>
@@ -12501,7 +12501,7 @@
               </a:ln>
               <a:extLst>
                 <a:ext uri="{91240B29-F687-4f45-9708-019B960494DF}">
-                  <a14:hiddenLine xmlns="" xmlns:a14="http://schemas.microsoft.com/office/drawing/2010/main" w="9525">
+                  <a14:hiddenLine xmlns:a14="http://schemas.microsoft.com/office/drawing/2010/main" xmlns="" w="9525">
                     <a:solidFill>
                       <a:srgbClr val="000000"/>
                     </a:solidFill>
@@ -12591,7 +12591,7 @@
               </a:ln>
               <a:extLst>
                 <a:ext uri="{91240B29-F687-4f45-9708-019B960494DF}">
-                  <a14:hiddenLine xmlns="" xmlns:a14="http://schemas.microsoft.com/office/drawing/2010/main" w="9525">
+                  <a14:hiddenLine xmlns:a14="http://schemas.microsoft.com/office/drawing/2010/main" xmlns="" w="9525">
                     <a:solidFill>
                       <a:srgbClr val="000000"/>
                     </a:solidFill>
@@ -12625,7 +12625,7 @@
               </a:ln>
               <a:extLst>
                 <a:ext uri="{91240B29-F687-4f45-9708-019B960494DF}">
-                  <a14:hiddenLine xmlns="" xmlns:a14="http://schemas.microsoft.com/office/drawing/2010/main" w="9525">
+                  <a14:hiddenLine xmlns:a14="http://schemas.microsoft.com/office/drawing/2010/main" xmlns="" w="9525">
                     <a:solidFill>
                       <a:srgbClr val="000000"/>
                     </a:solidFill>
@@ -13454,7 +13454,7 @@
             </a:ln>
             <a:extLst>
               <a:ext uri="{91240B29-F687-4f45-9708-019B960494DF}">
-                <a14:hiddenLine xmlns="" xmlns:a16="http://schemas.microsoft.com/office/drawing/2014/main" xmlns:p14="http://schemas.microsoft.com/office/powerpoint/2010/main" xmlns:a14="http://schemas.microsoft.com/office/drawing/2010/main" w="9525">
+                <a14:hiddenLine xmlns:a14="http://schemas.microsoft.com/office/drawing/2010/main" xmlns:p14="http://schemas.microsoft.com/office/powerpoint/2010/main" xmlns:a16="http://schemas.microsoft.com/office/drawing/2014/main" xmlns="" w="9525">
                   <a:solidFill>
                     <a:srgbClr val="000000"/>
                   </a:solidFill>
@@ -13559,7 +13559,7 @@
             </a:ln>
             <a:extLst>
               <a:ext uri="{91240B29-F687-4f45-9708-019B960494DF}">
-                <a14:hiddenLine xmlns="" xmlns:a16="http://schemas.microsoft.com/office/drawing/2014/main" xmlns:p14="http://schemas.microsoft.com/office/powerpoint/2010/main" xmlns:a14="http://schemas.microsoft.com/office/drawing/2010/main" w="9525">
+                <a14:hiddenLine xmlns:a14="http://schemas.microsoft.com/office/drawing/2010/main" xmlns:p14="http://schemas.microsoft.com/office/powerpoint/2010/main" xmlns:a16="http://schemas.microsoft.com/office/drawing/2014/main" xmlns="" w="9525">
                   <a:solidFill>
                     <a:srgbClr val="000000"/>
                   </a:solidFill>
@@ -13664,7 +13664,7 @@
             </a:ln>
             <a:extLst>
               <a:ext uri="{91240B29-F687-4f45-9708-019B960494DF}">
-                <a14:hiddenLine xmlns="" xmlns:a16="http://schemas.microsoft.com/office/drawing/2014/main" xmlns:p14="http://schemas.microsoft.com/office/powerpoint/2010/main" xmlns:a14="http://schemas.microsoft.com/office/drawing/2010/main" w="9525">
+                <a14:hiddenLine xmlns:a14="http://schemas.microsoft.com/office/drawing/2010/main" xmlns:p14="http://schemas.microsoft.com/office/powerpoint/2010/main" xmlns:a16="http://schemas.microsoft.com/office/drawing/2014/main" xmlns="" w="9525">
                   <a:solidFill>
                     <a:srgbClr val="000000"/>
                   </a:solidFill>
@@ -13741,7 +13741,7 @@
             </a:ln>
             <a:extLst>
               <a:ext uri="{91240B29-F687-4f45-9708-019B960494DF}">
-                <a14:hiddenLine xmlns="" xmlns:a16="http://schemas.microsoft.com/office/drawing/2014/main" xmlns:p14="http://schemas.microsoft.com/office/powerpoint/2010/main" xmlns:a14="http://schemas.microsoft.com/office/drawing/2010/main" w="9525">
+                <a14:hiddenLine xmlns:a14="http://schemas.microsoft.com/office/drawing/2010/main" xmlns:p14="http://schemas.microsoft.com/office/powerpoint/2010/main" xmlns:a16="http://schemas.microsoft.com/office/drawing/2014/main" xmlns="" w="9525">
                   <a:solidFill>
                     <a:srgbClr val="000000"/>
                   </a:solidFill>
@@ -13846,7 +13846,7 @@
             </a:ln>
             <a:extLst>
               <a:ext uri="{91240B29-F687-4f45-9708-019B960494DF}">
-                <a14:hiddenLine xmlns="" xmlns:a16="http://schemas.microsoft.com/office/drawing/2014/main" xmlns:p14="http://schemas.microsoft.com/office/powerpoint/2010/main" xmlns:a14="http://schemas.microsoft.com/office/drawing/2010/main" w="9525">
+                <a14:hiddenLine xmlns:a14="http://schemas.microsoft.com/office/drawing/2010/main" xmlns:p14="http://schemas.microsoft.com/office/powerpoint/2010/main" xmlns:a16="http://schemas.microsoft.com/office/drawing/2014/main" xmlns="" w="9525">
                   <a:solidFill>
                     <a:srgbClr val="000000"/>
                   </a:solidFill>
@@ -13923,7 +13923,7 @@
             </a:ln>
             <a:extLst>
               <a:ext uri="{91240B29-F687-4f45-9708-019B960494DF}">
-                <a14:hiddenLine xmlns="" xmlns:a16="http://schemas.microsoft.com/office/drawing/2014/main" xmlns:p14="http://schemas.microsoft.com/office/powerpoint/2010/main" xmlns:a14="http://schemas.microsoft.com/office/drawing/2010/main" w="9525">
+                <a14:hiddenLine xmlns:a14="http://schemas.microsoft.com/office/drawing/2010/main" xmlns:p14="http://schemas.microsoft.com/office/powerpoint/2010/main" xmlns:a16="http://schemas.microsoft.com/office/drawing/2014/main" xmlns="" w="9525">
                   <a:solidFill>
                     <a:srgbClr val="000000"/>
                   </a:solidFill>
@@ -14000,7 +14000,7 @@
             </a:ln>
             <a:extLst>
               <a:ext uri="{91240B29-F687-4f45-9708-019B960494DF}">
-                <a14:hiddenLine xmlns="" xmlns:a16="http://schemas.microsoft.com/office/drawing/2014/main" xmlns:p14="http://schemas.microsoft.com/office/powerpoint/2010/main" xmlns:a14="http://schemas.microsoft.com/office/drawing/2010/main" w="9525">
+                <a14:hiddenLine xmlns:a14="http://schemas.microsoft.com/office/drawing/2010/main" xmlns:p14="http://schemas.microsoft.com/office/powerpoint/2010/main" xmlns:a16="http://schemas.microsoft.com/office/drawing/2014/main" xmlns="" w="9525">
                   <a:solidFill>
                     <a:srgbClr val="000000"/>
                   </a:solidFill>
@@ -14105,7 +14105,7 @@
             </a:ln>
             <a:extLst>
               <a:ext uri="{91240B29-F687-4f45-9708-019B960494DF}">
-                <a14:hiddenLine xmlns="" xmlns:a16="http://schemas.microsoft.com/office/drawing/2014/main" xmlns:p14="http://schemas.microsoft.com/office/powerpoint/2010/main" xmlns:a14="http://schemas.microsoft.com/office/drawing/2010/main" w="9525">
+                <a14:hiddenLine xmlns:a14="http://schemas.microsoft.com/office/drawing/2010/main" xmlns:p14="http://schemas.microsoft.com/office/powerpoint/2010/main" xmlns:a16="http://schemas.microsoft.com/office/drawing/2014/main" xmlns="" w="9525">
                   <a:solidFill>
                     <a:srgbClr val="000000"/>
                   </a:solidFill>
@@ -14210,7 +14210,7 @@
             </a:ln>
             <a:extLst>
               <a:ext uri="{91240B29-F687-4f45-9708-019B960494DF}">
-                <a14:hiddenLine xmlns="" xmlns:a16="http://schemas.microsoft.com/office/drawing/2014/main" xmlns:p14="http://schemas.microsoft.com/office/powerpoint/2010/main" xmlns:a14="http://schemas.microsoft.com/office/drawing/2010/main" w="9525">
+                <a14:hiddenLine xmlns:a14="http://schemas.microsoft.com/office/drawing/2010/main" xmlns:p14="http://schemas.microsoft.com/office/powerpoint/2010/main" xmlns:a16="http://schemas.microsoft.com/office/drawing/2014/main" xmlns="" w="9525">
                   <a:solidFill>
                     <a:srgbClr val="000000"/>
                   </a:solidFill>
@@ -14287,7 +14287,7 @@
             </a:ln>
             <a:extLst>
               <a:ext uri="{91240B29-F687-4f45-9708-019B960494DF}">
-                <a14:hiddenLine xmlns="" xmlns:a16="http://schemas.microsoft.com/office/drawing/2014/main" xmlns:p14="http://schemas.microsoft.com/office/powerpoint/2010/main" xmlns:a14="http://schemas.microsoft.com/office/drawing/2010/main" w="9525">
+                <a14:hiddenLine xmlns:a14="http://schemas.microsoft.com/office/drawing/2010/main" xmlns:p14="http://schemas.microsoft.com/office/powerpoint/2010/main" xmlns:a16="http://schemas.microsoft.com/office/drawing/2014/main" xmlns="" w="9525">
                   <a:solidFill>
                     <a:srgbClr val="000000"/>
                   </a:solidFill>
@@ -14412,7 +14412,7 @@
             </a:ln>
             <a:extLst>
               <a:ext uri="{91240B29-F687-4f45-9708-019B960494DF}">
-                <a14:hiddenLine xmlns="" xmlns:a16="http://schemas.microsoft.com/office/drawing/2014/main" xmlns:p14="http://schemas.microsoft.com/office/powerpoint/2010/main" xmlns:a14="http://schemas.microsoft.com/office/drawing/2010/main" w="9525">
+                <a14:hiddenLine xmlns:a14="http://schemas.microsoft.com/office/drawing/2010/main" xmlns:p14="http://schemas.microsoft.com/office/powerpoint/2010/main" xmlns:a16="http://schemas.microsoft.com/office/drawing/2014/main" xmlns="" w="9525">
                   <a:solidFill>
                     <a:srgbClr val="000000"/>
                   </a:solidFill>
@@ -14526,7 +14526,7 @@
             </a:ln>
             <a:extLst>
               <a:ext uri="{91240B29-F687-4f45-9708-019B960494DF}">
-                <a14:hiddenLine xmlns="" xmlns:a16="http://schemas.microsoft.com/office/drawing/2014/main" xmlns:p14="http://schemas.microsoft.com/office/powerpoint/2010/main" xmlns:a14="http://schemas.microsoft.com/office/drawing/2010/main" w="9525">
+                <a14:hiddenLine xmlns:a14="http://schemas.microsoft.com/office/drawing/2010/main" xmlns:p14="http://schemas.microsoft.com/office/powerpoint/2010/main" xmlns:a16="http://schemas.microsoft.com/office/drawing/2014/main" xmlns="" w="9525">
                   <a:solidFill>
                     <a:srgbClr val="000000"/>
                   </a:solidFill>
@@ -14603,7 +14603,7 @@
             </a:ln>
             <a:extLst>
               <a:ext uri="{91240B29-F687-4f45-9708-019B960494DF}">
-                <a14:hiddenLine xmlns="" xmlns:a16="http://schemas.microsoft.com/office/drawing/2014/main" xmlns:p14="http://schemas.microsoft.com/office/powerpoint/2010/main" xmlns:a14="http://schemas.microsoft.com/office/drawing/2010/main" w="9525">
+                <a14:hiddenLine xmlns:a14="http://schemas.microsoft.com/office/drawing/2010/main" xmlns:p14="http://schemas.microsoft.com/office/powerpoint/2010/main" xmlns:a16="http://schemas.microsoft.com/office/drawing/2014/main" xmlns="" w="9525">
                   <a:solidFill>
                     <a:srgbClr val="000000"/>
                   </a:solidFill>
@@ -14680,7 +14680,7 @@
             </a:ln>
             <a:extLst>
               <a:ext uri="{91240B29-F687-4f45-9708-019B960494DF}">
-                <a14:hiddenLine xmlns="" xmlns:a16="http://schemas.microsoft.com/office/drawing/2014/main" xmlns:p14="http://schemas.microsoft.com/office/powerpoint/2010/main" xmlns:a14="http://schemas.microsoft.com/office/drawing/2010/main" w="9525">
+                <a14:hiddenLine xmlns:a14="http://schemas.microsoft.com/office/drawing/2010/main" xmlns:p14="http://schemas.microsoft.com/office/powerpoint/2010/main" xmlns:a16="http://schemas.microsoft.com/office/drawing/2014/main" xmlns="" w="9525">
                   <a:solidFill>
                     <a:srgbClr val="000000"/>
                   </a:solidFill>
@@ -14785,7 +14785,7 @@
             </a:ln>
             <a:extLst>
               <a:ext uri="{91240B29-F687-4f45-9708-019B960494DF}">
-                <a14:hiddenLine xmlns="" xmlns:a16="http://schemas.microsoft.com/office/drawing/2014/main" xmlns:p14="http://schemas.microsoft.com/office/powerpoint/2010/main" xmlns:a14="http://schemas.microsoft.com/office/drawing/2010/main" w="9525">
+                <a14:hiddenLine xmlns:a14="http://schemas.microsoft.com/office/drawing/2010/main" xmlns:p14="http://schemas.microsoft.com/office/powerpoint/2010/main" xmlns:a16="http://schemas.microsoft.com/office/drawing/2014/main" xmlns="" w="9525">
                   <a:solidFill>
                     <a:srgbClr val="000000"/>
                   </a:solidFill>
@@ -14834,7 +14834,7 @@
             </a:ln>
             <a:extLst>
               <a:ext uri="{91240B29-F687-4f45-9708-019B960494DF}">
-                <a14:hiddenLine xmlns="" xmlns:a16="http://schemas.microsoft.com/office/drawing/2014/main" xmlns:p14="http://schemas.microsoft.com/office/powerpoint/2010/main" xmlns:a14="http://schemas.microsoft.com/office/drawing/2010/main" w="9525">
+                <a14:hiddenLine xmlns:a14="http://schemas.microsoft.com/office/drawing/2010/main" xmlns:p14="http://schemas.microsoft.com/office/powerpoint/2010/main" xmlns:a16="http://schemas.microsoft.com/office/drawing/2014/main" xmlns="" w="9525">
                   <a:solidFill>
                     <a:srgbClr val="000000"/>
                   </a:solidFill>
@@ -14914,7 +14914,7 @@
             </a:ln>
             <a:extLst>
               <a:ext uri="{91240B29-F687-4f45-9708-019B960494DF}">
-                <a14:hiddenLine xmlns="" xmlns:a16="http://schemas.microsoft.com/office/drawing/2014/main" xmlns:p14="http://schemas.microsoft.com/office/powerpoint/2010/main" xmlns:a14="http://schemas.microsoft.com/office/drawing/2010/main" w="9525">
+                <a14:hiddenLine xmlns:a14="http://schemas.microsoft.com/office/drawing/2010/main" xmlns:p14="http://schemas.microsoft.com/office/powerpoint/2010/main" xmlns:a16="http://schemas.microsoft.com/office/drawing/2014/main" xmlns="" w="9525">
                   <a:solidFill>
                     <a:srgbClr val="000000"/>
                   </a:solidFill>
@@ -15019,7 +15019,7 @@
             </a:ln>
             <a:extLst>
               <a:ext uri="{91240B29-F687-4f45-9708-019B960494DF}">
-                <a14:hiddenLine xmlns="" xmlns:a16="http://schemas.microsoft.com/office/drawing/2014/main" xmlns:p14="http://schemas.microsoft.com/office/powerpoint/2010/main" xmlns:a14="http://schemas.microsoft.com/office/drawing/2010/main" w="9525">
+                <a14:hiddenLine xmlns:a14="http://schemas.microsoft.com/office/drawing/2010/main" xmlns:p14="http://schemas.microsoft.com/office/powerpoint/2010/main" xmlns:a16="http://schemas.microsoft.com/office/drawing/2014/main" xmlns="" w="9525">
                   <a:solidFill>
                     <a:srgbClr val="000000"/>
                   </a:solidFill>
@@ -15096,7 +15096,7 @@
             </a:ln>
             <a:extLst>
               <a:ext uri="{91240B29-F687-4f45-9708-019B960494DF}">
-                <a14:hiddenLine xmlns="" xmlns:a16="http://schemas.microsoft.com/office/drawing/2014/main" xmlns:p14="http://schemas.microsoft.com/office/powerpoint/2010/main" xmlns:a14="http://schemas.microsoft.com/office/drawing/2010/main" w="9525">
+                <a14:hiddenLine xmlns:a14="http://schemas.microsoft.com/office/drawing/2010/main" xmlns:p14="http://schemas.microsoft.com/office/powerpoint/2010/main" xmlns:a16="http://schemas.microsoft.com/office/drawing/2014/main" xmlns="" w="9525">
                   <a:solidFill>
                     <a:srgbClr val="000000"/>
                   </a:solidFill>
@@ -15201,7 +15201,7 @@
             </a:ln>
             <a:extLst>
               <a:ext uri="{91240B29-F687-4f45-9708-019B960494DF}">
-                <a14:hiddenLine xmlns="" xmlns:a16="http://schemas.microsoft.com/office/drawing/2014/main" xmlns:p14="http://schemas.microsoft.com/office/powerpoint/2010/main" xmlns:a14="http://schemas.microsoft.com/office/drawing/2010/main" w="9525">
+                <a14:hiddenLine xmlns:a14="http://schemas.microsoft.com/office/drawing/2010/main" xmlns:p14="http://schemas.microsoft.com/office/powerpoint/2010/main" xmlns:a16="http://schemas.microsoft.com/office/drawing/2014/main" xmlns="" w="9525">
                   <a:solidFill>
                     <a:srgbClr val="000000"/>
                   </a:solidFill>
@@ -15281,7 +15281,7 @@
             </a:ln>
             <a:extLst>
               <a:ext uri="{91240B29-F687-4f45-9708-019B960494DF}">
-                <a14:hiddenLine xmlns="" xmlns:a16="http://schemas.microsoft.com/office/drawing/2014/main" xmlns:p14="http://schemas.microsoft.com/office/powerpoint/2010/main" xmlns:a14="http://schemas.microsoft.com/office/drawing/2010/main" w="9525">
+                <a14:hiddenLine xmlns:a14="http://schemas.microsoft.com/office/drawing/2010/main" xmlns:p14="http://schemas.microsoft.com/office/powerpoint/2010/main" xmlns:a16="http://schemas.microsoft.com/office/drawing/2014/main" xmlns="" w="9525">
                   <a:solidFill>
                     <a:srgbClr val="000000"/>
                   </a:solidFill>
@@ -15358,7 +15358,7 @@
             </a:ln>
             <a:extLst>
               <a:ext uri="{91240B29-F687-4f45-9708-019B960494DF}">
-                <a14:hiddenLine xmlns="" xmlns:a16="http://schemas.microsoft.com/office/drawing/2014/main" xmlns:p14="http://schemas.microsoft.com/office/powerpoint/2010/main" xmlns:a14="http://schemas.microsoft.com/office/drawing/2010/main" w="9525">
+                <a14:hiddenLine xmlns:a14="http://schemas.microsoft.com/office/drawing/2010/main" xmlns:p14="http://schemas.microsoft.com/office/powerpoint/2010/main" xmlns:a16="http://schemas.microsoft.com/office/drawing/2014/main" xmlns="" w="9525">
                   <a:solidFill>
                     <a:srgbClr val="000000"/>
                   </a:solidFill>
@@ -15463,7 +15463,7 @@
             </a:ln>
             <a:extLst>
               <a:ext uri="{91240B29-F687-4f45-9708-019B960494DF}">
-                <a14:hiddenLine xmlns="" xmlns:a16="http://schemas.microsoft.com/office/drawing/2014/main" xmlns:p14="http://schemas.microsoft.com/office/powerpoint/2010/main" xmlns:a14="http://schemas.microsoft.com/office/drawing/2010/main" w="9525">
+                <a14:hiddenLine xmlns:a14="http://schemas.microsoft.com/office/drawing/2010/main" xmlns:p14="http://schemas.microsoft.com/office/powerpoint/2010/main" xmlns:a16="http://schemas.microsoft.com/office/drawing/2014/main" xmlns="" w="9525">
                   <a:solidFill>
                     <a:srgbClr val="000000"/>
                   </a:solidFill>
@@ -15568,7 +15568,7 @@
             </a:ln>
             <a:extLst>
               <a:ext uri="{91240B29-F687-4f45-9708-019B960494DF}">
-                <a14:hiddenLine xmlns="" xmlns:a16="http://schemas.microsoft.com/office/drawing/2014/main" xmlns:p14="http://schemas.microsoft.com/office/powerpoint/2010/main" xmlns:a14="http://schemas.microsoft.com/office/drawing/2010/main" w="9525">
+                <a14:hiddenLine xmlns:a14="http://schemas.microsoft.com/office/drawing/2010/main" xmlns:p14="http://schemas.microsoft.com/office/powerpoint/2010/main" xmlns:a16="http://schemas.microsoft.com/office/drawing/2014/main" xmlns="" w="9525">
                   <a:solidFill>
                     <a:srgbClr val="000000"/>
                   </a:solidFill>
@@ -15648,7 +15648,7 @@
             </a:ln>
             <a:extLst>
               <a:ext uri="{91240B29-F687-4f45-9708-019B960494DF}">
-                <a14:hiddenLine xmlns="" xmlns:a16="http://schemas.microsoft.com/office/drawing/2014/main" xmlns:p14="http://schemas.microsoft.com/office/powerpoint/2010/main" xmlns:a14="http://schemas.microsoft.com/office/drawing/2010/main" w="9525">
+                <a14:hiddenLine xmlns:a14="http://schemas.microsoft.com/office/drawing/2010/main" xmlns:p14="http://schemas.microsoft.com/office/powerpoint/2010/main" xmlns:a16="http://schemas.microsoft.com/office/drawing/2014/main" xmlns="" w="9525">
                   <a:solidFill>
                     <a:srgbClr val="000000"/>
                   </a:solidFill>
@@ -15783,7 +15783,7 @@
             </a:ln>
             <a:extLst>
               <a:ext uri="{91240B29-F687-4f45-9708-019B960494DF}">
-                <a14:hiddenLine xmlns="" xmlns:a16="http://schemas.microsoft.com/office/drawing/2014/main" xmlns:p14="http://schemas.microsoft.com/office/powerpoint/2010/main" xmlns:a14="http://schemas.microsoft.com/office/drawing/2010/main" w="9525">
+                <a14:hiddenLine xmlns:a14="http://schemas.microsoft.com/office/drawing/2010/main" xmlns:p14="http://schemas.microsoft.com/office/powerpoint/2010/main" xmlns:a16="http://schemas.microsoft.com/office/drawing/2014/main" xmlns="" w="9525">
                   <a:solidFill>
                     <a:srgbClr val="000000"/>
                   </a:solidFill>
@@ -16025,7 +16025,7 @@
             </a:ln>
             <a:extLst>
               <a:ext uri="{91240B29-F687-4f45-9708-019B960494DF}">
-                <a14:hiddenLine xmlns="" xmlns:a16="http://schemas.microsoft.com/office/drawing/2014/main" xmlns:p14="http://schemas.microsoft.com/office/powerpoint/2010/main" xmlns:a14="http://schemas.microsoft.com/office/drawing/2010/main" w="9525">
+                <a14:hiddenLine xmlns:a14="http://schemas.microsoft.com/office/drawing/2010/main" xmlns:p14="http://schemas.microsoft.com/office/powerpoint/2010/main" xmlns:a16="http://schemas.microsoft.com/office/drawing/2014/main" xmlns="" w="9525">
                   <a:solidFill>
                     <a:srgbClr val="000000"/>
                   </a:solidFill>
@@ -16155,7 +16155,7 @@
             </a:ln>
             <a:extLst>
               <a:ext uri="{91240B29-F687-4f45-9708-019B960494DF}">
-                <a14:hiddenLine xmlns="" xmlns:a16="http://schemas.microsoft.com/office/drawing/2014/main" xmlns:p14="http://schemas.microsoft.com/office/powerpoint/2010/main" xmlns:a14="http://schemas.microsoft.com/office/drawing/2010/main" w="9525">
+                <a14:hiddenLine xmlns:a14="http://schemas.microsoft.com/office/drawing/2010/main" xmlns:p14="http://schemas.microsoft.com/office/powerpoint/2010/main" xmlns:a16="http://schemas.microsoft.com/office/drawing/2014/main" xmlns="" w="9525">
                   <a:solidFill>
                     <a:srgbClr val="000000"/>
                   </a:solidFill>
@@ -16260,7 +16260,7 @@
             </a:ln>
             <a:extLst>
               <a:ext uri="{91240B29-F687-4f45-9708-019B960494DF}">
-                <a14:hiddenLine xmlns="" xmlns:a16="http://schemas.microsoft.com/office/drawing/2014/main" xmlns:p14="http://schemas.microsoft.com/office/powerpoint/2010/main" xmlns:a14="http://schemas.microsoft.com/office/drawing/2010/main" w="9525">
+                <a14:hiddenLine xmlns:a14="http://schemas.microsoft.com/office/drawing/2010/main" xmlns:p14="http://schemas.microsoft.com/office/powerpoint/2010/main" xmlns:a16="http://schemas.microsoft.com/office/drawing/2014/main" xmlns="" w="9525">
                   <a:solidFill>
                     <a:srgbClr val="000000"/>
                   </a:solidFill>
@@ -16340,7 +16340,7 @@
             </a:ln>
             <a:extLst>
               <a:ext uri="{91240B29-F687-4f45-9708-019B960494DF}">
-                <a14:hiddenLine xmlns="" xmlns:a16="http://schemas.microsoft.com/office/drawing/2014/main" xmlns:p14="http://schemas.microsoft.com/office/powerpoint/2010/main" xmlns:a14="http://schemas.microsoft.com/office/drawing/2010/main" w="9525">
+                <a14:hiddenLine xmlns:a14="http://schemas.microsoft.com/office/drawing/2010/main" xmlns:p14="http://schemas.microsoft.com/office/powerpoint/2010/main" xmlns:a16="http://schemas.microsoft.com/office/drawing/2014/main" xmlns="" w="9525">
                   <a:solidFill>
                     <a:srgbClr val="000000"/>
                   </a:solidFill>
@@ -16445,7 +16445,7 @@
             </a:ln>
             <a:extLst>
               <a:ext uri="{91240B29-F687-4f45-9708-019B960494DF}">
-                <a14:hiddenLine xmlns="" xmlns:a16="http://schemas.microsoft.com/office/drawing/2014/main" xmlns:p14="http://schemas.microsoft.com/office/powerpoint/2010/main" xmlns:a14="http://schemas.microsoft.com/office/drawing/2010/main" w="9525">
+                <a14:hiddenLine xmlns:a14="http://schemas.microsoft.com/office/drawing/2010/main" xmlns:p14="http://schemas.microsoft.com/office/powerpoint/2010/main" xmlns:a16="http://schemas.microsoft.com/office/drawing/2014/main" xmlns="" w="9525">
                   <a:solidFill>
                     <a:srgbClr val="000000"/>
                   </a:solidFill>
@@ -16528,7 +16528,7 @@
             </a:ln>
             <a:extLst>
               <a:ext uri="{91240B29-F687-4f45-9708-019B960494DF}">
-                <a14:hiddenLine xmlns="" xmlns:a16="http://schemas.microsoft.com/office/drawing/2014/main" xmlns:p14="http://schemas.microsoft.com/office/powerpoint/2010/main" xmlns:a14="http://schemas.microsoft.com/office/drawing/2010/main" w="9525">
+                <a14:hiddenLine xmlns:a14="http://schemas.microsoft.com/office/drawing/2010/main" xmlns:p14="http://schemas.microsoft.com/office/powerpoint/2010/main" xmlns:a16="http://schemas.microsoft.com/office/drawing/2014/main" xmlns="" w="9525">
                   <a:solidFill>
                     <a:srgbClr val="000000"/>
                   </a:solidFill>
@@ -16633,7 +16633,7 @@
             </a:ln>
             <a:extLst>
               <a:ext uri="{91240B29-F687-4f45-9708-019B960494DF}">
-                <a14:hiddenLine xmlns="" xmlns:a16="http://schemas.microsoft.com/office/drawing/2014/main" xmlns:p14="http://schemas.microsoft.com/office/powerpoint/2010/main" xmlns:a14="http://schemas.microsoft.com/office/drawing/2010/main" w="9525">
+                <a14:hiddenLine xmlns:a14="http://schemas.microsoft.com/office/drawing/2010/main" xmlns:p14="http://schemas.microsoft.com/office/powerpoint/2010/main" xmlns:a16="http://schemas.microsoft.com/office/drawing/2014/main" xmlns="" w="9525">
                   <a:solidFill>
                     <a:srgbClr val="000000"/>
                   </a:solidFill>
@@ -16716,7 +16716,7 @@
             </a:ln>
             <a:extLst>
               <a:ext uri="{91240B29-F687-4f45-9708-019B960494DF}">
-                <a14:hiddenLine xmlns="" xmlns:a16="http://schemas.microsoft.com/office/drawing/2014/main" xmlns:p14="http://schemas.microsoft.com/office/powerpoint/2010/main" xmlns:a14="http://schemas.microsoft.com/office/drawing/2010/main" w="9525">
+                <a14:hiddenLine xmlns:a14="http://schemas.microsoft.com/office/drawing/2010/main" xmlns:p14="http://schemas.microsoft.com/office/powerpoint/2010/main" xmlns:a16="http://schemas.microsoft.com/office/drawing/2014/main" xmlns="" w="9525">
                   <a:solidFill>
                     <a:srgbClr val="000000"/>
                   </a:solidFill>
@@ -16821,7 +16821,7 @@
             </a:ln>
             <a:extLst>
               <a:ext uri="{91240B29-F687-4f45-9708-019B960494DF}">
-                <a14:hiddenLine xmlns="" xmlns:a16="http://schemas.microsoft.com/office/drawing/2014/main" xmlns:p14="http://schemas.microsoft.com/office/powerpoint/2010/main" xmlns:a14="http://schemas.microsoft.com/office/drawing/2010/main" w="9525">
+                <a14:hiddenLine xmlns:a14="http://schemas.microsoft.com/office/drawing/2010/main" xmlns:p14="http://schemas.microsoft.com/office/powerpoint/2010/main" xmlns:a16="http://schemas.microsoft.com/office/drawing/2014/main" xmlns="" w="9525">
                   <a:solidFill>
                     <a:srgbClr val="000000"/>
                   </a:solidFill>
@@ -16870,7 +16870,7 @@
             </a:ln>
             <a:extLst>
               <a:ext uri="{91240B29-F687-4f45-9708-019B960494DF}">
-                <a14:hiddenLine xmlns="" xmlns:a16="http://schemas.microsoft.com/office/drawing/2014/main" xmlns:p14="http://schemas.microsoft.com/office/powerpoint/2010/main" xmlns:a14="http://schemas.microsoft.com/office/drawing/2010/main" w="9525">
+                <a14:hiddenLine xmlns:a14="http://schemas.microsoft.com/office/drawing/2010/main" xmlns:p14="http://schemas.microsoft.com/office/powerpoint/2010/main" xmlns:a16="http://schemas.microsoft.com/office/drawing/2014/main" xmlns="" w="9525">
                   <a:solidFill>
                     <a:srgbClr val="000000"/>
                   </a:solidFill>
@@ -16974,7 +16974,7 @@
             </a:r>
             <a:r>
               <a:rPr lang="en-US" dirty="0"/>
-              <a:t>, P., Willis, J., &amp; Humble, J. (2015). The DevOps Handbook: How to Create World-Class Speed, Reliability, and Security in Technology Organizations. It Revolution Press.</a:t>
+              <a:t>, P., Willis, J., &amp; Humble, J. (2021). The DevOps Handbook: How to Create World-Class Speed, Reliability, and Security in Technology Organizations. It Revolution Press.</a:t>
             </a:r>
           </a:p>
           <a:p>
@@ -17059,7 +17059,7 @@
             </a:br>
             <a:r>
               <a:rPr lang="en-US" dirty="0"/>
-              <a:t>(KIM, Et Al. 2014)</a:t>
+              <a:t>(KIM, Et Al. 2021)</a:t>
             </a:r>
           </a:p>
         </p:txBody>
@@ -17257,7 +17257,7 @@
             </a:r>
             <a:r>
               <a:rPr lang="en-US" dirty="0"/>
-              <a:t>, et al. 2014)</a:t>
+              <a:t>, et al. 2021)</a:t>
             </a:r>
           </a:p>
         </p:txBody>

</xml_diff>